<commit_message>
pulling results for paper
</commit_message>
<xml_diff>
--- a/modsel/paramest/ModSelAnalysis_FlowDiagram.pptx
+++ b/modsel/paramest/ModSelAnalysis_FlowDiagram.pptx
@@ -2,13 +2,14 @@
 <file path=ppt/presentation.xml><?xml version="1.0" encoding="utf-8"?>
 <p:presentation xmlns:a="http://schemas.openxmlformats.org/drawingml/2006/main" xmlns:r="http://schemas.openxmlformats.org/officeDocument/2006/relationships" xmlns:p="http://schemas.openxmlformats.org/presentationml/2006/main" saveSubsetFonts="1" autoCompressPictures="0">
   <p:sldMasterIdLst>
-    <p:sldMasterId id="2147483732" r:id="rId1"/>
+    <p:sldMasterId id="2147483744" r:id="rId1"/>
   </p:sldMasterIdLst>
   <p:sldIdLst>
     <p:sldId id="256" r:id="rId2"/>
     <p:sldId id="258" r:id="rId3"/>
+    <p:sldId id="259" r:id="rId4"/>
   </p:sldIdLst>
-  <p:sldSz cx="16459200" cy="7315200"/>
+  <p:sldSz cx="16459200" cy="16459200"/>
   <p:notesSz cx="6858000" cy="9144000"/>
   <p:defaultTextStyle>
     <a:defPPr>
@@ -108,7 +109,7 @@
   <p:extLst>
     <p:ext uri="{EFAFB233-063F-42B5-8137-9DF3F51BA10A}">
       <p15:sldGuideLst xmlns:p15="http://schemas.microsoft.com/office/powerpoint/2012/main">
-        <p15:guide id="1" orient="horz" pos="2304" userDrawn="1">
+        <p15:guide id="1" orient="horz" pos="5184" userDrawn="1">
           <p15:clr>
             <a:srgbClr val="A4A3A4"/>
           </p15:clr>
@@ -165,15 +166,15 @@
         </p:nvSpPr>
         <p:spPr>
           <a:xfrm>
-            <a:off x="2057400" y="1197187"/>
-            <a:ext cx="12344400" cy="2546773"/>
+            <a:off x="1234440" y="2693671"/>
+            <a:ext cx="13990320" cy="5730240"/>
           </a:xfrm>
         </p:spPr>
         <p:txBody>
           <a:bodyPr anchor="b"/>
           <a:lstStyle>
             <a:lvl1pPr algn="ctr">
-              <a:defRPr sz="6400"/>
+              <a:defRPr sz="10800"/>
             </a:lvl1pPr>
           </a:lstStyle>
           <a:p>
@@ -197,8 +198,8 @@
         </p:nvSpPr>
         <p:spPr>
           <a:xfrm>
-            <a:off x="2057400" y="3842174"/>
-            <a:ext cx="12344400" cy="1766146"/>
+            <a:off x="2057400" y="8644891"/>
+            <a:ext cx="12344400" cy="3973829"/>
           </a:xfrm>
         </p:spPr>
         <p:txBody>
@@ -206,39 +207,39 @@
           <a:lstStyle>
             <a:lvl1pPr marL="0" indent="0" algn="ctr">
               <a:buNone/>
-              <a:defRPr sz="2560"/>
+              <a:defRPr sz="4320"/>
             </a:lvl1pPr>
-            <a:lvl2pPr marL="487695" indent="0" algn="ctr">
+            <a:lvl2pPr marL="822960" indent="0" algn="ctr">
               <a:buNone/>
-              <a:defRPr sz="2133"/>
+              <a:defRPr sz="3600"/>
             </a:lvl2pPr>
-            <a:lvl3pPr marL="975390" indent="0" algn="ctr">
+            <a:lvl3pPr marL="1645920" indent="0" algn="ctr">
               <a:buNone/>
-              <a:defRPr sz="1920"/>
+              <a:defRPr sz="3240"/>
             </a:lvl3pPr>
-            <a:lvl4pPr marL="1463086" indent="0" algn="ctr">
+            <a:lvl4pPr marL="2468880" indent="0" algn="ctr">
               <a:buNone/>
-              <a:defRPr sz="1707"/>
+              <a:defRPr sz="2880"/>
             </a:lvl4pPr>
-            <a:lvl5pPr marL="1950781" indent="0" algn="ctr">
+            <a:lvl5pPr marL="3291840" indent="0" algn="ctr">
               <a:buNone/>
-              <a:defRPr sz="1707"/>
+              <a:defRPr sz="2880"/>
             </a:lvl5pPr>
-            <a:lvl6pPr marL="2438476" indent="0" algn="ctr">
+            <a:lvl6pPr marL="4114800" indent="0" algn="ctr">
               <a:buNone/>
-              <a:defRPr sz="1707"/>
+              <a:defRPr sz="2880"/>
             </a:lvl6pPr>
-            <a:lvl7pPr marL="2926171" indent="0" algn="ctr">
+            <a:lvl7pPr marL="4937760" indent="0" algn="ctr">
               <a:buNone/>
-              <a:defRPr sz="1707"/>
+              <a:defRPr sz="2880"/>
             </a:lvl7pPr>
-            <a:lvl8pPr marL="3413867" indent="0" algn="ctr">
+            <a:lvl8pPr marL="5760720" indent="0" algn="ctr">
               <a:buNone/>
-              <a:defRPr sz="1707"/>
+              <a:defRPr sz="2880"/>
             </a:lvl8pPr>
-            <a:lvl9pPr marL="3901562" indent="0" algn="ctr">
+            <a:lvl9pPr marL="6583680" indent="0" algn="ctr">
               <a:buNone/>
-              <a:defRPr sz="1707"/>
+              <a:defRPr sz="2880"/>
             </a:lvl9pPr>
           </a:lstStyle>
           <a:p>
@@ -267,7 +268,7 @@
           <a:p>
             <a:fld id="{957CF60C-A504-6447-9F1C-7F75B010BCC6}" type="datetimeFigureOut">
               <a:rPr lang="en-US" smtClean="0"/>
-              <a:t>9/8/22</a:t>
+              <a:t>10/25/22</a:t>
             </a:fld>
             <a:endParaRPr lang="en-US"/>
           </a:p>
@@ -318,7 +319,7 @@
     </p:spTree>
     <p:extLst>
       <p:ext uri="{BB962C8B-B14F-4D97-AF65-F5344CB8AC3E}">
-        <p14:creationId xmlns:p14="http://schemas.microsoft.com/office/powerpoint/2010/main" val="3537333995"/>
+        <p14:creationId xmlns:p14="http://schemas.microsoft.com/office/powerpoint/2010/main" val="2086794763"/>
       </p:ext>
     </p:extLst>
   </p:cSld>
@@ -437,7 +438,7 @@
           <a:p>
             <a:fld id="{957CF60C-A504-6447-9F1C-7F75B010BCC6}" type="datetimeFigureOut">
               <a:rPr lang="en-US" smtClean="0"/>
-              <a:t>9/8/22</a:t>
+              <a:t>10/25/22</a:t>
             </a:fld>
             <a:endParaRPr lang="en-US"/>
           </a:p>
@@ -488,7 +489,7 @@
     </p:spTree>
     <p:extLst>
       <p:ext uri="{BB962C8B-B14F-4D97-AF65-F5344CB8AC3E}">
-        <p14:creationId xmlns:p14="http://schemas.microsoft.com/office/powerpoint/2010/main" val="2534165961"/>
+        <p14:creationId xmlns:p14="http://schemas.microsoft.com/office/powerpoint/2010/main" val="3298786129"/>
       </p:ext>
     </p:extLst>
   </p:cSld>
@@ -527,8 +528,8 @@
         </p:nvSpPr>
         <p:spPr>
           <a:xfrm>
-            <a:off x="11778615" y="389467"/>
-            <a:ext cx="3549015" cy="6199294"/>
+            <a:off x="11778616" y="876300"/>
+            <a:ext cx="3549015" cy="13948411"/>
           </a:xfrm>
         </p:spPr>
         <p:txBody>
@@ -555,8 +556,8 @@
         </p:nvSpPr>
         <p:spPr>
           <a:xfrm>
-            <a:off x="1131570" y="389467"/>
-            <a:ext cx="10441305" cy="6199294"/>
+            <a:off x="1131571" y="876300"/>
+            <a:ext cx="10441305" cy="13948411"/>
           </a:xfrm>
         </p:spPr>
         <p:txBody>
@@ -617,7 +618,7 @@
           <a:p>
             <a:fld id="{957CF60C-A504-6447-9F1C-7F75B010BCC6}" type="datetimeFigureOut">
               <a:rPr lang="en-US" smtClean="0"/>
-              <a:t>9/8/22</a:t>
+              <a:t>10/25/22</a:t>
             </a:fld>
             <a:endParaRPr lang="en-US"/>
           </a:p>
@@ -668,7 +669,7 @@
     </p:spTree>
     <p:extLst>
       <p:ext uri="{BB962C8B-B14F-4D97-AF65-F5344CB8AC3E}">
-        <p14:creationId xmlns:p14="http://schemas.microsoft.com/office/powerpoint/2010/main" val="1829484010"/>
+        <p14:creationId xmlns:p14="http://schemas.microsoft.com/office/powerpoint/2010/main" val="2306974740"/>
       </p:ext>
     </p:extLst>
   </p:cSld>
@@ -787,7 +788,7 @@
           <a:p>
             <a:fld id="{957CF60C-A504-6447-9F1C-7F75B010BCC6}" type="datetimeFigureOut">
               <a:rPr lang="en-US" smtClean="0"/>
-              <a:t>9/8/22</a:t>
+              <a:t>10/25/22</a:t>
             </a:fld>
             <a:endParaRPr lang="en-US"/>
           </a:p>
@@ -838,7 +839,7 @@
     </p:spTree>
     <p:extLst>
       <p:ext uri="{BB962C8B-B14F-4D97-AF65-F5344CB8AC3E}">
-        <p14:creationId xmlns:p14="http://schemas.microsoft.com/office/powerpoint/2010/main" val="1500681669"/>
+        <p14:creationId xmlns:p14="http://schemas.microsoft.com/office/powerpoint/2010/main" val="1818993241"/>
       </p:ext>
     </p:extLst>
   </p:cSld>
@@ -877,15 +878,15 @@
         </p:nvSpPr>
         <p:spPr>
           <a:xfrm>
-            <a:off x="1122998" y="1823721"/>
-            <a:ext cx="14196060" cy="3042919"/>
+            <a:off x="1122998" y="4103375"/>
+            <a:ext cx="14196060" cy="6846569"/>
           </a:xfrm>
         </p:spPr>
         <p:txBody>
           <a:bodyPr anchor="b"/>
           <a:lstStyle>
             <a:lvl1pPr>
-              <a:defRPr sz="6400"/>
+              <a:defRPr sz="10800"/>
             </a:lvl1pPr>
           </a:lstStyle>
           <a:p>
@@ -909,8 +910,8 @@
         </p:nvSpPr>
         <p:spPr>
           <a:xfrm>
-            <a:off x="1122998" y="4895428"/>
-            <a:ext cx="14196060" cy="1600199"/>
+            <a:off x="1122998" y="11014715"/>
+            <a:ext cx="14196060" cy="3600449"/>
           </a:xfrm>
         </p:spPr>
         <p:txBody>
@@ -918,17 +919,15 @@
           <a:lstStyle>
             <a:lvl1pPr marL="0" indent="0">
               <a:buNone/>
-              <a:defRPr sz="2560">
+              <a:defRPr sz="4320">
                 <a:solidFill>
-                  <a:schemeClr val="tx1">
-                    <a:tint val="75000"/>
-                  </a:schemeClr>
+                  <a:schemeClr val="tx1"/>
                 </a:solidFill>
               </a:defRPr>
             </a:lvl1pPr>
-            <a:lvl2pPr marL="487695" indent="0">
+            <a:lvl2pPr marL="822960" indent="0">
               <a:buNone/>
-              <a:defRPr sz="2133">
+              <a:defRPr sz="3600">
                 <a:solidFill>
                   <a:schemeClr val="tx1">
                     <a:tint val="75000"/>
@@ -936,9 +935,9 @@
                 </a:solidFill>
               </a:defRPr>
             </a:lvl2pPr>
-            <a:lvl3pPr marL="975390" indent="0">
+            <a:lvl3pPr marL="1645920" indent="0">
               <a:buNone/>
-              <a:defRPr sz="1920">
+              <a:defRPr sz="3240">
                 <a:solidFill>
                   <a:schemeClr val="tx1">
                     <a:tint val="75000"/>
@@ -946,9 +945,9 @@
                 </a:solidFill>
               </a:defRPr>
             </a:lvl3pPr>
-            <a:lvl4pPr marL="1463086" indent="0">
+            <a:lvl4pPr marL="2468880" indent="0">
               <a:buNone/>
-              <a:defRPr sz="1707">
+              <a:defRPr sz="2880">
                 <a:solidFill>
                   <a:schemeClr val="tx1">
                     <a:tint val="75000"/>
@@ -956,9 +955,9 @@
                 </a:solidFill>
               </a:defRPr>
             </a:lvl4pPr>
-            <a:lvl5pPr marL="1950781" indent="0">
+            <a:lvl5pPr marL="3291840" indent="0">
               <a:buNone/>
-              <a:defRPr sz="1707">
+              <a:defRPr sz="2880">
                 <a:solidFill>
                   <a:schemeClr val="tx1">
                     <a:tint val="75000"/>
@@ -966,9 +965,9 @@
                 </a:solidFill>
               </a:defRPr>
             </a:lvl5pPr>
-            <a:lvl6pPr marL="2438476" indent="0">
+            <a:lvl6pPr marL="4114800" indent="0">
               <a:buNone/>
-              <a:defRPr sz="1707">
+              <a:defRPr sz="2880">
                 <a:solidFill>
                   <a:schemeClr val="tx1">
                     <a:tint val="75000"/>
@@ -976,9 +975,9 @@
                 </a:solidFill>
               </a:defRPr>
             </a:lvl6pPr>
-            <a:lvl7pPr marL="2926171" indent="0">
+            <a:lvl7pPr marL="4937760" indent="0">
               <a:buNone/>
-              <a:defRPr sz="1707">
+              <a:defRPr sz="2880">
                 <a:solidFill>
                   <a:schemeClr val="tx1">
                     <a:tint val="75000"/>
@@ -986,9 +985,9 @@
                 </a:solidFill>
               </a:defRPr>
             </a:lvl7pPr>
-            <a:lvl8pPr marL="3413867" indent="0">
+            <a:lvl8pPr marL="5760720" indent="0">
               <a:buNone/>
-              <a:defRPr sz="1707">
+              <a:defRPr sz="2880">
                 <a:solidFill>
                   <a:schemeClr val="tx1">
                     <a:tint val="75000"/>
@@ -996,9 +995,9 @@
                 </a:solidFill>
               </a:defRPr>
             </a:lvl8pPr>
-            <a:lvl9pPr marL="3901562" indent="0">
+            <a:lvl9pPr marL="6583680" indent="0">
               <a:buNone/>
-              <a:defRPr sz="1707">
+              <a:defRPr sz="2880">
                 <a:solidFill>
                   <a:schemeClr val="tx1">
                     <a:tint val="75000"/>
@@ -1033,7 +1032,7 @@
           <a:p>
             <a:fld id="{957CF60C-A504-6447-9F1C-7F75B010BCC6}" type="datetimeFigureOut">
               <a:rPr lang="en-US" smtClean="0"/>
-              <a:t>9/8/22</a:t>
+              <a:t>10/25/22</a:t>
             </a:fld>
             <a:endParaRPr lang="en-US"/>
           </a:p>
@@ -1084,7 +1083,7 @@
     </p:spTree>
     <p:extLst>
       <p:ext uri="{BB962C8B-B14F-4D97-AF65-F5344CB8AC3E}">
-        <p14:creationId xmlns:p14="http://schemas.microsoft.com/office/powerpoint/2010/main" val="4104122989"/>
+        <p14:creationId xmlns:p14="http://schemas.microsoft.com/office/powerpoint/2010/main" val="1686156612"/>
       </p:ext>
     </p:extLst>
   </p:cSld>
@@ -1146,8 +1145,8 @@
         </p:nvSpPr>
         <p:spPr>
           <a:xfrm>
-            <a:off x="1131570" y="1947333"/>
-            <a:ext cx="6995160" cy="4641427"/>
+            <a:off x="1131570" y="4381500"/>
+            <a:ext cx="6995160" cy="10443211"/>
           </a:xfrm>
         </p:spPr>
         <p:txBody>
@@ -1203,8 +1202,8 @@
         </p:nvSpPr>
         <p:spPr>
           <a:xfrm>
-            <a:off x="8332470" y="1947333"/>
-            <a:ext cx="6995160" cy="4641427"/>
+            <a:off x="8332470" y="4381500"/>
+            <a:ext cx="6995160" cy="10443211"/>
           </a:xfrm>
         </p:spPr>
         <p:txBody>
@@ -1265,7 +1264,7 @@
           <a:p>
             <a:fld id="{957CF60C-A504-6447-9F1C-7F75B010BCC6}" type="datetimeFigureOut">
               <a:rPr lang="en-US" smtClean="0"/>
-              <a:t>9/8/22</a:t>
+              <a:t>10/25/22</a:t>
             </a:fld>
             <a:endParaRPr lang="en-US"/>
           </a:p>
@@ -1316,7 +1315,7 @@
     </p:spTree>
     <p:extLst>
       <p:ext uri="{BB962C8B-B14F-4D97-AF65-F5344CB8AC3E}">
-        <p14:creationId xmlns:p14="http://schemas.microsoft.com/office/powerpoint/2010/main" val="4018913669"/>
+        <p14:creationId xmlns:p14="http://schemas.microsoft.com/office/powerpoint/2010/main" val="1402055768"/>
       </p:ext>
     </p:extLst>
   </p:cSld>
@@ -1355,8 +1354,8 @@
         </p:nvSpPr>
         <p:spPr>
           <a:xfrm>
-            <a:off x="1133714" y="389467"/>
-            <a:ext cx="14196060" cy="1413934"/>
+            <a:off x="1133714" y="876304"/>
+            <a:ext cx="14196060" cy="3181351"/>
           </a:xfrm>
         </p:spPr>
         <p:txBody>
@@ -1383,8 +1382,8 @@
         </p:nvSpPr>
         <p:spPr>
           <a:xfrm>
-            <a:off x="1133715" y="1793241"/>
-            <a:ext cx="6963012" cy="878839"/>
+            <a:off x="1133716" y="4034791"/>
+            <a:ext cx="6963012" cy="1977389"/>
           </a:xfrm>
         </p:spPr>
         <p:txBody>
@@ -1392,39 +1391,39 @@
           <a:lstStyle>
             <a:lvl1pPr marL="0" indent="0">
               <a:buNone/>
-              <a:defRPr sz="2560" b="1"/>
+              <a:defRPr sz="4320" b="1"/>
             </a:lvl1pPr>
-            <a:lvl2pPr marL="487695" indent="0">
+            <a:lvl2pPr marL="822960" indent="0">
               <a:buNone/>
-              <a:defRPr sz="2133" b="1"/>
+              <a:defRPr sz="3600" b="1"/>
             </a:lvl2pPr>
-            <a:lvl3pPr marL="975390" indent="0">
+            <a:lvl3pPr marL="1645920" indent="0">
               <a:buNone/>
-              <a:defRPr sz="1920" b="1"/>
+              <a:defRPr sz="3240" b="1"/>
             </a:lvl3pPr>
-            <a:lvl4pPr marL="1463086" indent="0">
+            <a:lvl4pPr marL="2468880" indent="0">
               <a:buNone/>
-              <a:defRPr sz="1707" b="1"/>
+              <a:defRPr sz="2880" b="1"/>
             </a:lvl4pPr>
-            <a:lvl5pPr marL="1950781" indent="0">
+            <a:lvl5pPr marL="3291840" indent="0">
               <a:buNone/>
-              <a:defRPr sz="1707" b="1"/>
+              <a:defRPr sz="2880" b="1"/>
             </a:lvl5pPr>
-            <a:lvl6pPr marL="2438476" indent="0">
+            <a:lvl6pPr marL="4114800" indent="0">
               <a:buNone/>
-              <a:defRPr sz="1707" b="1"/>
+              <a:defRPr sz="2880" b="1"/>
             </a:lvl6pPr>
-            <a:lvl7pPr marL="2926171" indent="0">
+            <a:lvl7pPr marL="4937760" indent="0">
               <a:buNone/>
-              <a:defRPr sz="1707" b="1"/>
+              <a:defRPr sz="2880" b="1"/>
             </a:lvl7pPr>
-            <a:lvl8pPr marL="3413867" indent="0">
+            <a:lvl8pPr marL="5760720" indent="0">
               <a:buNone/>
-              <a:defRPr sz="1707" b="1"/>
+              <a:defRPr sz="2880" b="1"/>
             </a:lvl8pPr>
-            <a:lvl9pPr marL="3901562" indent="0">
+            <a:lvl9pPr marL="6583680" indent="0">
               <a:buNone/>
-              <a:defRPr sz="1707" b="1"/>
+              <a:defRPr sz="2880" b="1"/>
             </a:lvl9pPr>
           </a:lstStyle>
           <a:p>
@@ -1448,8 +1447,8 @@
         </p:nvSpPr>
         <p:spPr>
           <a:xfrm>
-            <a:off x="1133715" y="2672080"/>
-            <a:ext cx="6963012" cy="3930227"/>
+            <a:off x="1133716" y="6012180"/>
+            <a:ext cx="6963012" cy="8843011"/>
           </a:xfrm>
         </p:spPr>
         <p:txBody>
@@ -1505,8 +1504,8 @@
         </p:nvSpPr>
         <p:spPr>
           <a:xfrm>
-            <a:off x="8332470" y="1793241"/>
-            <a:ext cx="6997304" cy="878839"/>
+            <a:off x="8332471" y="4034791"/>
+            <a:ext cx="6997304" cy="1977389"/>
           </a:xfrm>
         </p:spPr>
         <p:txBody>
@@ -1514,39 +1513,39 @@
           <a:lstStyle>
             <a:lvl1pPr marL="0" indent="0">
               <a:buNone/>
-              <a:defRPr sz="2560" b="1"/>
+              <a:defRPr sz="4320" b="1"/>
             </a:lvl1pPr>
-            <a:lvl2pPr marL="487695" indent="0">
+            <a:lvl2pPr marL="822960" indent="0">
               <a:buNone/>
-              <a:defRPr sz="2133" b="1"/>
+              <a:defRPr sz="3600" b="1"/>
             </a:lvl2pPr>
-            <a:lvl3pPr marL="975390" indent="0">
+            <a:lvl3pPr marL="1645920" indent="0">
               <a:buNone/>
-              <a:defRPr sz="1920" b="1"/>
+              <a:defRPr sz="3240" b="1"/>
             </a:lvl3pPr>
-            <a:lvl4pPr marL="1463086" indent="0">
+            <a:lvl4pPr marL="2468880" indent="0">
               <a:buNone/>
-              <a:defRPr sz="1707" b="1"/>
+              <a:defRPr sz="2880" b="1"/>
             </a:lvl4pPr>
-            <a:lvl5pPr marL="1950781" indent="0">
+            <a:lvl5pPr marL="3291840" indent="0">
               <a:buNone/>
-              <a:defRPr sz="1707" b="1"/>
+              <a:defRPr sz="2880" b="1"/>
             </a:lvl5pPr>
-            <a:lvl6pPr marL="2438476" indent="0">
+            <a:lvl6pPr marL="4114800" indent="0">
               <a:buNone/>
-              <a:defRPr sz="1707" b="1"/>
+              <a:defRPr sz="2880" b="1"/>
             </a:lvl6pPr>
-            <a:lvl7pPr marL="2926171" indent="0">
+            <a:lvl7pPr marL="4937760" indent="0">
               <a:buNone/>
-              <a:defRPr sz="1707" b="1"/>
+              <a:defRPr sz="2880" b="1"/>
             </a:lvl7pPr>
-            <a:lvl8pPr marL="3413867" indent="0">
+            <a:lvl8pPr marL="5760720" indent="0">
               <a:buNone/>
-              <a:defRPr sz="1707" b="1"/>
+              <a:defRPr sz="2880" b="1"/>
             </a:lvl8pPr>
-            <a:lvl9pPr marL="3901562" indent="0">
+            <a:lvl9pPr marL="6583680" indent="0">
               <a:buNone/>
-              <a:defRPr sz="1707" b="1"/>
+              <a:defRPr sz="2880" b="1"/>
             </a:lvl9pPr>
           </a:lstStyle>
           <a:p>
@@ -1570,8 +1569,8 @@
         </p:nvSpPr>
         <p:spPr>
           <a:xfrm>
-            <a:off x="8332470" y="2672080"/>
-            <a:ext cx="6997304" cy="3930227"/>
+            <a:off x="8332471" y="6012180"/>
+            <a:ext cx="6997304" cy="8843011"/>
           </a:xfrm>
         </p:spPr>
         <p:txBody>
@@ -1632,7 +1631,7 @@
           <a:p>
             <a:fld id="{957CF60C-A504-6447-9F1C-7F75B010BCC6}" type="datetimeFigureOut">
               <a:rPr lang="en-US" smtClean="0"/>
-              <a:t>9/8/22</a:t>
+              <a:t>10/25/22</a:t>
             </a:fld>
             <a:endParaRPr lang="en-US"/>
           </a:p>
@@ -1683,7 +1682,7 @@
     </p:spTree>
     <p:extLst>
       <p:ext uri="{BB962C8B-B14F-4D97-AF65-F5344CB8AC3E}">
-        <p14:creationId xmlns:p14="http://schemas.microsoft.com/office/powerpoint/2010/main" val="3273835541"/>
+        <p14:creationId xmlns:p14="http://schemas.microsoft.com/office/powerpoint/2010/main" val="97841124"/>
       </p:ext>
     </p:extLst>
   </p:cSld>
@@ -1750,7 +1749,7 @@
           <a:p>
             <a:fld id="{957CF60C-A504-6447-9F1C-7F75B010BCC6}" type="datetimeFigureOut">
               <a:rPr lang="en-US" smtClean="0"/>
-              <a:t>9/8/22</a:t>
+              <a:t>10/25/22</a:t>
             </a:fld>
             <a:endParaRPr lang="en-US"/>
           </a:p>
@@ -1801,7 +1800,7 @@
     </p:spTree>
     <p:extLst>
       <p:ext uri="{BB962C8B-B14F-4D97-AF65-F5344CB8AC3E}">
-        <p14:creationId xmlns:p14="http://schemas.microsoft.com/office/powerpoint/2010/main" val="3404570807"/>
+        <p14:creationId xmlns:p14="http://schemas.microsoft.com/office/powerpoint/2010/main" val="2844742229"/>
       </p:ext>
     </p:extLst>
   </p:cSld>
@@ -1845,7 +1844,7 @@
           <a:p>
             <a:fld id="{957CF60C-A504-6447-9F1C-7F75B010BCC6}" type="datetimeFigureOut">
               <a:rPr lang="en-US" smtClean="0"/>
-              <a:t>9/8/22</a:t>
+              <a:t>10/25/22</a:t>
             </a:fld>
             <a:endParaRPr lang="en-US"/>
           </a:p>
@@ -1896,7 +1895,7 @@
     </p:spTree>
     <p:extLst>
       <p:ext uri="{BB962C8B-B14F-4D97-AF65-F5344CB8AC3E}">
-        <p14:creationId xmlns:p14="http://schemas.microsoft.com/office/powerpoint/2010/main" val="3499590124"/>
+        <p14:creationId xmlns:p14="http://schemas.microsoft.com/office/powerpoint/2010/main" val="3903251117"/>
       </p:ext>
     </p:extLst>
   </p:cSld>
@@ -1935,15 +1934,15 @@
         </p:nvSpPr>
         <p:spPr>
           <a:xfrm>
-            <a:off x="1133714" y="487680"/>
-            <a:ext cx="5308520" cy="1706880"/>
+            <a:off x="1133714" y="1097280"/>
+            <a:ext cx="5308520" cy="3840480"/>
           </a:xfrm>
         </p:spPr>
         <p:txBody>
           <a:bodyPr anchor="b"/>
           <a:lstStyle>
             <a:lvl1pPr>
-              <a:defRPr sz="3413"/>
+              <a:defRPr sz="5760"/>
             </a:lvl1pPr>
           </a:lstStyle>
           <a:p>
@@ -1967,39 +1966,39 @@
         </p:nvSpPr>
         <p:spPr>
           <a:xfrm>
-            <a:off x="6997304" y="1053254"/>
-            <a:ext cx="8332470" cy="5198533"/>
+            <a:off x="6997304" y="2369824"/>
+            <a:ext cx="8332470" cy="11696700"/>
           </a:xfrm>
         </p:spPr>
         <p:txBody>
           <a:bodyPr/>
           <a:lstStyle>
             <a:lvl1pPr>
-              <a:defRPr sz="3413"/>
+              <a:defRPr sz="5760"/>
             </a:lvl1pPr>
             <a:lvl2pPr>
-              <a:defRPr sz="2987"/>
+              <a:defRPr sz="5040"/>
             </a:lvl2pPr>
             <a:lvl3pPr>
-              <a:defRPr sz="2560"/>
+              <a:defRPr sz="4320"/>
             </a:lvl3pPr>
             <a:lvl4pPr>
-              <a:defRPr sz="2133"/>
+              <a:defRPr sz="3600"/>
             </a:lvl4pPr>
             <a:lvl5pPr>
-              <a:defRPr sz="2133"/>
+              <a:defRPr sz="3600"/>
             </a:lvl5pPr>
             <a:lvl6pPr>
-              <a:defRPr sz="2133"/>
+              <a:defRPr sz="3600"/>
             </a:lvl6pPr>
             <a:lvl7pPr>
-              <a:defRPr sz="2133"/>
+              <a:defRPr sz="3600"/>
             </a:lvl7pPr>
             <a:lvl8pPr>
-              <a:defRPr sz="2133"/>
+              <a:defRPr sz="3600"/>
             </a:lvl8pPr>
             <a:lvl9pPr>
-              <a:defRPr sz="2133"/>
+              <a:defRPr sz="3600"/>
             </a:lvl9pPr>
           </a:lstStyle>
           <a:p>
@@ -2052,8 +2051,8 @@
         </p:nvSpPr>
         <p:spPr>
           <a:xfrm>
-            <a:off x="1133714" y="2194560"/>
-            <a:ext cx="5308520" cy="4065694"/>
+            <a:off x="1133714" y="4937760"/>
+            <a:ext cx="5308520" cy="9147811"/>
           </a:xfrm>
         </p:spPr>
         <p:txBody>
@@ -2061,39 +2060,39 @@
           <a:lstStyle>
             <a:lvl1pPr marL="0" indent="0">
               <a:buNone/>
-              <a:defRPr sz="1707"/>
+              <a:defRPr sz="2880"/>
             </a:lvl1pPr>
-            <a:lvl2pPr marL="487695" indent="0">
+            <a:lvl2pPr marL="822960" indent="0">
               <a:buNone/>
-              <a:defRPr sz="1493"/>
+              <a:defRPr sz="2520"/>
             </a:lvl2pPr>
-            <a:lvl3pPr marL="975390" indent="0">
+            <a:lvl3pPr marL="1645920" indent="0">
               <a:buNone/>
-              <a:defRPr sz="1280"/>
+              <a:defRPr sz="2160"/>
             </a:lvl3pPr>
-            <a:lvl4pPr marL="1463086" indent="0">
+            <a:lvl4pPr marL="2468880" indent="0">
               <a:buNone/>
-              <a:defRPr sz="1067"/>
+              <a:defRPr sz="1800"/>
             </a:lvl4pPr>
-            <a:lvl5pPr marL="1950781" indent="0">
+            <a:lvl5pPr marL="3291840" indent="0">
               <a:buNone/>
-              <a:defRPr sz="1067"/>
+              <a:defRPr sz="1800"/>
             </a:lvl5pPr>
-            <a:lvl6pPr marL="2438476" indent="0">
+            <a:lvl6pPr marL="4114800" indent="0">
               <a:buNone/>
-              <a:defRPr sz="1067"/>
+              <a:defRPr sz="1800"/>
             </a:lvl6pPr>
-            <a:lvl7pPr marL="2926171" indent="0">
+            <a:lvl7pPr marL="4937760" indent="0">
               <a:buNone/>
-              <a:defRPr sz="1067"/>
+              <a:defRPr sz="1800"/>
             </a:lvl7pPr>
-            <a:lvl8pPr marL="3413867" indent="0">
+            <a:lvl8pPr marL="5760720" indent="0">
               <a:buNone/>
-              <a:defRPr sz="1067"/>
+              <a:defRPr sz="1800"/>
             </a:lvl8pPr>
-            <a:lvl9pPr marL="3901562" indent="0">
+            <a:lvl9pPr marL="6583680" indent="0">
               <a:buNone/>
-              <a:defRPr sz="1067"/>
+              <a:defRPr sz="1800"/>
             </a:lvl9pPr>
           </a:lstStyle>
           <a:p>
@@ -2122,7 +2121,7 @@
           <a:p>
             <a:fld id="{957CF60C-A504-6447-9F1C-7F75B010BCC6}" type="datetimeFigureOut">
               <a:rPr lang="en-US" smtClean="0"/>
-              <a:t>9/8/22</a:t>
+              <a:t>10/25/22</a:t>
             </a:fld>
             <a:endParaRPr lang="en-US"/>
           </a:p>
@@ -2173,7 +2172,7 @@
     </p:spTree>
     <p:extLst>
       <p:ext uri="{BB962C8B-B14F-4D97-AF65-F5344CB8AC3E}">
-        <p14:creationId xmlns:p14="http://schemas.microsoft.com/office/powerpoint/2010/main" val="4097384278"/>
+        <p14:creationId xmlns:p14="http://schemas.microsoft.com/office/powerpoint/2010/main" val="2988752404"/>
       </p:ext>
     </p:extLst>
   </p:cSld>
@@ -2212,15 +2211,15 @@
         </p:nvSpPr>
         <p:spPr>
           <a:xfrm>
-            <a:off x="1133714" y="487680"/>
-            <a:ext cx="5308520" cy="1706880"/>
+            <a:off x="1133714" y="1097280"/>
+            <a:ext cx="5308520" cy="3840480"/>
           </a:xfrm>
         </p:spPr>
         <p:txBody>
           <a:bodyPr anchor="b"/>
           <a:lstStyle>
             <a:lvl1pPr>
-              <a:defRPr sz="3413"/>
+              <a:defRPr sz="5760"/>
             </a:lvl1pPr>
           </a:lstStyle>
           <a:p>
@@ -2244,8 +2243,8 @@
         </p:nvSpPr>
         <p:spPr>
           <a:xfrm>
-            <a:off x="6997304" y="1053254"/>
-            <a:ext cx="8332470" cy="5198533"/>
+            <a:off x="6997304" y="2369824"/>
+            <a:ext cx="8332470" cy="11696700"/>
           </a:xfrm>
         </p:spPr>
         <p:txBody>
@@ -2253,39 +2252,39 @@
           <a:lstStyle>
             <a:lvl1pPr marL="0" indent="0">
               <a:buNone/>
-              <a:defRPr sz="3413"/>
+              <a:defRPr sz="5760"/>
             </a:lvl1pPr>
-            <a:lvl2pPr marL="487695" indent="0">
+            <a:lvl2pPr marL="822960" indent="0">
               <a:buNone/>
-              <a:defRPr sz="2987"/>
+              <a:defRPr sz="5040"/>
             </a:lvl2pPr>
-            <a:lvl3pPr marL="975390" indent="0">
+            <a:lvl3pPr marL="1645920" indent="0">
               <a:buNone/>
-              <a:defRPr sz="2560"/>
+              <a:defRPr sz="4320"/>
             </a:lvl3pPr>
-            <a:lvl4pPr marL="1463086" indent="0">
+            <a:lvl4pPr marL="2468880" indent="0">
               <a:buNone/>
-              <a:defRPr sz="2133"/>
+              <a:defRPr sz="3600"/>
             </a:lvl4pPr>
-            <a:lvl5pPr marL="1950781" indent="0">
+            <a:lvl5pPr marL="3291840" indent="0">
               <a:buNone/>
-              <a:defRPr sz="2133"/>
+              <a:defRPr sz="3600"/>
             </a:lvl5pPr>
-            <a:lvl6pPr marL="2438476" indent="0">
+            <a:lvl6pPr marL="4114800" indent="0">
               <a:buNone/>
-              <a:defRPr sz="2133"/>
+              <a:defRPr sz="3600"/>
             </a:lvl6pPr>
-            <a:lvl7pPr marL="2926171" indent="0">
+            <a:lvl7pPr marL="4937760" indent="0">
               <a:buNone/>
-              <a:defRPr sz="2133"/>
+              <a:defRPr sz="3600"/>
             </a:lvl7pPr>
-            <a:lvl8pPr marL="3413867" indent="0">
+            <a:lvl8pPr marL="5760720" indent="0">
               <a:buNone/>
-              <a:defRPr sz="2133"/>
+              <a:defRPr sz="3600"/>
             </a:lvl8pPr>
-            <a:lvl9pPr marL="3901562" indent="0">
+            <a:lvl9pPr marL="6583680" indent="0">
               <a:buNone/>
-              <a:defRPr sz="2133"/>
+              <a:defRPr sz="3600"/>
             </a:lvl9pPr>
           </a:lstStyle>
           <a:p>
@@ -2309,8 +2308,8 @@
         </p:nvSpPr>
         <p:spPr>
           <a:xfrm>
-            <a:off x="1133714" y="2194560"/>
-            <a:ext cx="5308520" cy="4065694"/>
+            <a:off x="1133714" y="4937760"/>
+            <a:ext cx="5308520" cy="9147811"/>
           </a:xfrm>
         </p:spPr>
         <p:txBody>
@@ -2318,39 +2317,39 @@
           <a:lstStyle>
             <a:lvl1pPr marL="0" indent="0">
               <a:buNone/>
-              <a:defRPr sz="1707"/>
+              <a:defRPr sz="2880"/>
             </a:lvl1pPr>
-            <a:lvl2pPr marL="487695" indent="0">
+            <a:lvl2pPr marL="822960" indent="0">
               <a:buNone/>
-              <a:defRPr sz="1493"/>
+              <a:defRPr sz="2520"/>
             </a:lvl2pPr>
-            <a:lvl3pPr marL="975390" indent="0">
+            <a:lvl3pPr marL="1645920" indent="0">
               <a:buNone/>
-              <a:defRPr sz="1280"/>
+              <a:defRPr sz="2160"/>
             </a:lvl3pPr>
-            <a:lvl4pPr marL="1463086" indent="0">
+            <a:lvl4pPr marL="2468880" indent="0">
               <a:buNone/>
-              <a:defRPr sz="1067"/>
+              <a:defRPr sz="1800"/>
             </a:lvl4pPr>
-            <a:lvl5pPr marL="1950781" indent="0">
+            <a:lvl5pPr marL="3291840" indent="0">
               <a:buNone/>
-              <a:defRPr sz="1067"/>
+              <a:defRPr sz="1800"/>
             </a:lvl5pPr>
-            <a:lvl6pPr marL="2438476" indent="0">
+            <a:lvl6pPr marL="4114800" indent="0">
               <a:buNone/>
-              <a:defRPr sz="1067"/>
+              <a:defRPr sz="1800"/>
             </a:lvl6pPr>
-            <a:lvl7pPr marL="2926171" indent="0">
+            <a:lvl7pPr marL="4937760" indent="0">
               <a:buNone/>
-              <a:defRPr sz="1067"/>
+              <a:defRPr sz="1800"/>
             </a:lvl7pPr>
-            <a:lvl8pPr marL="3413867" indent="0">
+            <a:lvl8pPr marL="5760720" indent="0">
               <a:buNone/>
-              <a:defRPr sz="1067"/>
+              <a:defRPr sz="1800"/>
             </a:lvl8pPr>
-            <a:lvl9pPr marL="3901562" indent="0">
+            <a:lvl9pPr marL="6583680" indent="0">
               <a:buNone/>
-              <a:defRPr sz="1067"/>
+              <a:defRPr sz="1800"/>
             </a:lvl9pPr>
           </a:lstStyle>
           <a:p>
@@ -2379,7 +2378,7 @@
           <a:p>
             <a:fld id="{957CF60C-A504-6447-9F1C-7F75B010BCC6}" type="datetimeFigureOut">
               <a:rPr lang="en-US" smtClean="0"/>
-              <a:t>9/8/22</a:t>
+              <a:t>10/25/22</a:t>
             </a:fld>
             <a:endParaRPr lang="en-US"/>
           </a:p>
@@ -2430,7 +2429,7 @@
     </p:spTree>
     <p:extLst>
       <p:ext uri="{BB962C8B-B14F-4D97-AF65-F5344CB8AC3E}">
-        <p14:creationId xmlns:p14="http://schemas.microsoft.com/office/powerpoint/2010/main" val="3914353899"/>
+        <p14:creationId xmlns:p14="http://schemas.microsoft.com/office/powerpoint/2010/main" val="2977697218"/>
       </p:ext>
     </p:extLst>
   </p:cSld>
@@ -2474,8 +2473,8 @@
         </p:nvSpPr>
         <p:spPr>
           <a:xfrm>
-            <a:off x="1131570" y="389467"/>
-            <a:ext cx="14196060" cy="1413934"/>
+            <a:off x="1131570" y="876304"/>
+            <a:ext cx="14196060" cy="3181351"/>
           </a:xfrm>
           <a:prstGeom prst="rect">
             <a:avLst/>
@@ -2507,8 +2506,8 @@
         </p:nvSpPr>
         <p:spPr>
           <a:xfrm>
-            <a:off x="1131570" y="1947333"/>
-            <a:ext cx="14196060" cy="4641427"/>
+            <a:off x="1131570" y="4381500"/>
+            <a:ext cx="14196060" cy="10443211"/>
           </a:xfrm>
           <a:prstGeom prst="rect">
             <a:avLst/>
@@ -2569,8 +2568,8 @@
         </p:nvSpPr>
         <p:spPr>
           <a:xfrm>
-            <a:off x="1131570" y="6780107"/>
-            <a:ext cx="3703320" cy="389467"/>
+            <a:off x="1131570" y="15255244"/>
+            <a:ext cx="3703320" cy="876300"/>
           </a:xfrm>
           <a:prstGeom prst="rect">
             <a:avLst/>
@@ -2580,7 +2579,7 @@
           <a:bodyPr vert="horz" lIns="91440" tIns="45720" rIns="91440" bIns="45720" rtlCol="0" anchor="ctr"/>
           <a:lstStyle>
             <a:lvl1pPr algn="l">
-              <a:defRPr sz="1280">
+              <a:defRPr sz="2160">
                 <a:solidFill>
                   <a:schemeClr val="tx1">
                     <a:tint val="75000"/>
@@ -2592,7 +2591,7 @@
           <a:p>
             <a:fld id="{957CF60C-A504-6447-9F1C-7F75B010BCC6}" type="datetimeFigureOut">
               <a:rPr lang="en-US" smtClean="0"/>
-              <a:t>9/8/22</a:t>
+              <a:t>10/25/22</a:t>
             </a:fld>
             <a:endParaRPr lang="en-US"/>
           </a:p>
@@ -2610,8 +2609,8 @@
         </p:nvSpPr>
         <p:spPr>
           <a:xfrm>
-            <a:off x="5452110" y="6780107"/>
-            <a:ext cx="5554980" cy="389467"/>
+            <a:off x="5452110" y="15255244"/>
+            <a:ext cx="5554980" cy="876300"/>
           </a:xfrm>
           <a:prstGeom prst="rect">
             <a:avLst/>
@@ -2621,7 +2620,7 @@
           <a:bodyPr vert="horz" lIns="91440" tIns="45720" rIns="91440" bIns="45720" rtlCol="0" anchor="ctr"/>
           <a:lstStyle>
             <a:lvl1pPr algn="ctr">
-              <a:defRPr sz="1280">
+              <a:defRPr sz="2160">
                 <a:solidFill>
                   <a:schemeClr val="tx1">
                     <a:tint val="75000"/>
@@ -2647,8 +2646,8 @@
         </p:nvSpPr>
         <p:spPr>
           <a:xfrm>
-            <a:off x="11624310" y="6780107"/>
-            <a:ext cx="3703320" cy="389467"/>
+            <a:off x="11624310" y="15255244"/>
+            <a:ext cx="3703320" cy="876300"/>
           </a:xfrm>
           <a:prstGeom prst="rect">
             <a:avLst/>
@@ -2658,7 +2657,7 @@
           <a:bodyPr vert="horz" lIns="91440" tIns="45720" rIns="91440" bIns="45720" rtlCol="0" anchor="ctr"/>
           <a:lstStyle>
             <a:lvl1pPr algn="r">
-              <a:defRPr sz="1280">
+              <a:defRPr sz="2160">
                 <a:solidFill>
                   <a:schemeClr val="tx1">
                     <a:tint val="75000"/>
@@ -2679,27 +2678,27 @@
     </p:spTree>
     <p:extLst>
       <p:ext uri="{BB962C8B-B14F-4D97-AF65-F5344CB8AC3E}">
-        <p14:creationId xmlns:p14="http://schemas.microsoft.com/office/powerpoint/2010/main" val="3739609895"/>
+        <p14:creationId xmlns:p14="http://schemas.microsoft.com/office/powerpoint/2010/main" val="100810119"/>
       </p:ext>
     </p:extLst>
   </p:cSld>
   <p:clrMap bg1="lt1" tx1="dk1" bg2="lt2" tx2="dk2" accent1="accent1" accent2="accent2" accent3="accent3" accent4="accent4" accent5="accent5" accent6="accent6" hlink="hlink" folHlink="folHlink"/>
   <p:sldLayoutIdLst>
-    <p:sldLayoutId id="2147483733" r:id="rId1"/>
-    <p:sldLayoutId id="2147483734" r:id="rId2"/>
-    <p:sldLayoutId id="2147483735" r:id="rId3"/>
-    <p:sldLayoutId id="2147483736" r:id="rId4"/>
-    <p:sldLayoutId id="2147483737" r:id="rId5"/>
-    <p:sldLayoutId id="2147483738" r:id="rId6"/>
-    <p:sldLayoutId id="2147483739" r:id="rId7"/>
-    <p:sldLayoutId id="2147483740" r:id="rId8"/>
-    <p:sldLayoutId id="2147483741" r:id="rId9"/>
-    <p:sldLayoutId id="2147483742" r:id="rId10"/>
-    <p:sldLayoutId id="2147483743" r:id="rId11"/>
+    <p:sldLayoutId id="2147483745" r:id="rId1"/>
+    <p:sldLayoutId id="2147483746" r:id="rId2"/>
+    <p:sldLayoutId id="2147483747" r:id="rId3"/>
+    <p:sldLayoutId id="2147483748" r:id="rId4"/>
+    <p:sldLayoutId id="2147483749" r:id="rId5"/>
+    <p:sldLayoutId id="2147483750" r:id="rId6"/>
+    <p:sldLayoutId id="2147483751" r:id="rId7"/>
+    <p:sldLayoutId id="2147483752" r:id="rId8"/>
+    <p:sldLayoutId id="2147483753" r:id="rId9"/>
+    <p:sldLayoutId id="2147483754" r:id="rId10"/>
+    <p:sldLayoutId id="2147483755" r:id="rId11"/>
   </p:sldLayoutIdLst>
   <p:txStyles>
     <p:titleStyle>
-      <a:lvl1pPr algn="l" defTabSz="975390" rtl="0" eaLnBrk="1" latinLnBrk="0" hangingPunct="1">
+      <a:lvl1pPr algn="l" defTabSz="1645920" rtl="0" eaLnBrk="1" latinLnBrk="0" hangingPunct="1">
         <a:lnSpc>
           <a:spcPct val="90000"/>
         </a:lnSpc>
@@ -2707,7 +2706,7 @@
           <a:spcPct val="0"/>
         </a:spcBef>
         <a:buNone/>
-        <a:defRPr sz="4693" kern="1200">
+        <a:defRPr sz="7920" kern="1200">
           <a:solidFill>
             <a:schemeClr val="tx1"/>
           </a:solidFill>
@@ -2718,16 +2717,16 @@
       </a:lvl1pPr>
     </p:titleStyle>
     <p:bodyStyle>
-      <a:lvl1pPr marL="243848" indent="-243848" algn="l" defTabSz="975390" rtl="0" eaLnBrk="1" latinLnBrk="0" hangingPunct="1">
+      <a:lvl1pPr marL="411480" indent="-411480" algn="l" defTabSz="1645920" rtl="0" eaLnBrk="1" latinLnBrk="0" hangingPunct="1">
         <a:lnSpc>
           <a:spcPct val="90000"/>
         </a:lnSpc>
         <a:spcBef>
-          <a:spcPts val="1067"/>
+          <a:spcPts val="1800"/>
         </a:spcBef>
         <a:buFont typeface="Arial" panose="020B0604020202020204" pitchFamily="34" charset="0"/>
         <a:buChar char="•"/>
-        <a:defRPr sz="2987" kern="1200">
+        <a:defRPr sz="5040" kern="1200">
           <a:solidFill>
             <a:schemeClr val="tx1"/>
           </a:solidFill>
@@ -2736,16 +2735,16 @@
           <a:cs typeface="+mn-cs"/>
         </a:defRPr>
       </a:lvl1pPr>
-      <a:lvl2pPr marL="731543" indent="-243848" algn="l" defTabSz="975390" rtl="0" eaLnBrk="1" latinLnBrk="0" hangingPunct="1">
+      <a:lvl2pPr marL="1234440" indent="-411480" algn="l" defTabSz="1645920" rtl="0" eaLnBrk="1" latinLnBrk="0" hangingPunct="1">
         <a:lnSpc>
           <a:spcPct val="90000"/>
         </a:lnSpc>
         <a:spcBef>
-          <a:spcPts val="533"/>
+          <a:spcPts val="900"/>
         </a:spcBef>
         <a:buFont typeface="Arial" panose="020B0604020202020204" pitchFamily="34" charset="0"/>
         <a:buChar char="•"/>
-        <a:defRPr sz="2560" kern="1200">
+        <a:defRPr sz="4320" kern="1200">
           <a:solidFill>
             <a:schemeClr val="tx1"/>
           </a:solidFill>
@@ -2754,16 +2753,16 @@
           <a:cs typeface="+mn-cs"/>
         </a:defRPr>
       </a:lvl2pPr>
-      <a:lvl3pPr marL="1219238" indent="-243848" algn="l" defTabSz="975390" rtl="0" eaLnBrk="1" latinLnBrk="0" hangingPunct="1">
+      <a:lvl3pPr marL="2057400" indent="-411480" algn="l" defTabSz="1645920" rtl="0" eaLnBrk="1" latinLnBrk="0" hangingPunct="1">
         <a:lnSpc>
           <a:spcPct val="90000"/>
         </a:lnSpc>
         <a:spcBef>
-          <a:spcPts val="533"/>
+          <a:spcPts val="900"/>
         </a:spcBef>
         <a:buFont typeface="Arial" panose="020B0604020202020204" pitchFamily="34" charset="0"/>
         <a:buChar char="•"/>
-        <a:defRPr sz="2133" kern="1200">
+        <a:defRPr sz="3600" kern="1200">
           <a:solidFill>
             <a:schemeClr val="tx1"/>
           </a:solidFill>
@@ -2772,16 +2771,16 @@
           <a:cs typeface="+mn-cs"/>
         </a:defRPr>
       </a:lvl3pPr>
-      <a:lvl4pPr marL="1706933" indent="-243848" algn="l" defTabSz="975390" rtl="0" eaLnBrk="1" latinLnBrk="0" hangingPunct="1">
+      <a:lvl4pPr marL="2880360" indent="-411480" algn="l" defTabSz="1645920" rtl="0" eaLnBrk="1" latinLnBrk="0" hangingPunct="1">
         <a:lnSpc>
           <a:spcPct val="90000"/>
         </a:lnSpc>
         <a:spcBef>
-          <a:spcPts val="533"/>
+          <a:spcPts val="900"/>
         </a:spcBef>
         <a:buFont typeface="Arial" panose="020B0604020202020204" pitchFamily="34" charset="0"/>
         <a:buChar char="•"/>
-        <a:defRPr sz="1920" kern="1200">
+        <a:defRPr sz="3240" kern="1200">
           <a:solidFill>
             <a:schemeClr val="tx1"/>
           </a:solidFill>
@@ -2790,16 +2789,16 @@
           <a:cs typeface="+mn-cs"/>
         </a:defRPr>
       </a:lvl4pPr>
-      <a:lvl5pPr marL="2194629" indent="-243848" algn="l" defTabSz="975390" rtl="0" eaLnBrk="1" latinLnBrk="0" hangingPunct="1">
+      <a:lvl5pPr marL="3703320" indent="-411480" algn="l" defTabSz="1645920" rtl="0" eaLnBrk="1" latinLnBrk="0" hangingPunct="1">
         <a:lnSpc>
           <a:spcPct val="90000"/>
         </a:lnSpc>
         <a:spcBef>
-          <a:spcPts val="533"/>
+          <a:spcPts val="900"/>
         </a:spcBef>
         <a:buFont typeface="Arial" panose="020B0604020202020204" pitchFamily="34" charset="0"/>
         <a:buChar char="•"/>
-        <a:defRPr sz="1920" kern="1200">
+        <a:defRPr sz="3240" kern="1200">
           <a:solidFill>
             <a:schemeClr val="tx1"/>
           </a:solidFill>
@@ -2808,16 +2807,16 @@
           <a:cs typeface="+mn-cs"/>
         </a:defRPr>
       </a:lvl5pPr>
-      <a:lvl6pPr marL="2682324" indent="-243848" algn="l" defTabSz="975390" rtl="0" eaLnBrk="1" latinLnBrk="0" hangingPunct="1">
+      <a:lvl6pPr marL="4526280" indent="-411480" algn="l" defTabSz="1645920" rtl="0" eaLnBrk="1" latinLnBrk="0" hangingPunct="1">
         <a:lnSpc>
           <a:spcPct val="90000"/>
         </a:lnSpc>
         <a:spcBef>
-          <a:spcPts val="533"/>
+          <a:spcPts val="900"/>
         </a:spcBef>
         <a:buFont typeface="Arial" panose="020B0604020202020204" pitchFamily="34" charset="0"/>
         <a:buChar char="•"/>
-        <a:defRPr sz="1920" kern="1200">
+        <a:defRPr sz="3240" kern="1200">
           <a:solidFill>
             <a:schemeClr val="tx1"/>
           </a:solidFill>
@@ -2826,16 +2825,16 @@
           <a:cs typeface="+mn-cs"/>
         </a:defRPr>
       </a:lvl6pPr>
-      <a:lvl7pPr marL="3170019" indent="-243848" algn="l" defTabSz="975390" rtl="0" eaLnBrk="1" latinLnBrk="0" hangingPunct="1">
+      <a:lvl7pPr marL="5349240" indent="-411480" algn="l" defTabSz="1645920" rtl="0" eaLnBrk="1" latinLnBrk="0" hangingPunct="1">
         <a:lnSpc>
           <a:spcPct val="90000"/>
         </a:lnSpc>
         <a:spcBef>
-          <a:spcPts val="533"/>
+          <a:spcPts val="900"/>
         </a:spcBef>
         <a:buFont typeface="Arial" panose="020B0604020202020204" pitchFamily="34" charset="0"/>
         <a:buChar char="•"/>
-        <a:defRPr sz="1920" kern="1200">
+        <a:defRPr sz="3240" kern="1200">
           <a:solidFill>
             <a:schemeClr val="tx1"/>
           </a:solidFill>
@@ -2844,16 +2843,16 @@
           <a:cs typeface="+mn-cs"/>
         </a:defRPr>
       </a:lvl7pPr>
-      <a:lvl8pPr marL="3657714" indent="-243848" algn="l" defTabSz="975390" rtl="0" eaLnBrk="1" latinLnBrk="0" hangingPunct="1">
+      <a:lvl8pPr marL="6172200" indent="-411480" algn="l" defTabSz="1645920" rtl="0" eaLnBrk="1" latinLnBrk="0" hangingPunct="1">
         <a:lnSpc>
           <a:spcPct val="90000"/>
         </a:lnSpc>
         <a:spcBef>
-          <a:spcPts val="533"/>
+          <a:spcPts val="900"/>
         </a:spcBef>
         <a:buFont typeface="Arial" panose="020B0604020202020204" pitchFamily="34" charset="0"/>
         <a:buChar char="•"/>
-        <a:defRPr sz="1920" kern="1200">
+        <a:defRPr sz="3240" kern="1200">
           <a:solidFill>
             <a:schemeClr val="tx1"/>
           </a:solidFill>
@@ -2862,16 +2861,16 @@
           <a:cs typeface="+mn-cs"/>
         </a:defRPr>
       </a:lvl8pPr>
-      <a:lvl9pPr marL="4145410" indent="-243848" algn="l" defTabSz="975390" rtl="0" eaLnBrk="1" latinLnBrk="0" hangingPunct="1">
+      <a:lvl9pPr marL="6995160" indent="-411480" algn="l" defTabSz="1645920" rtl="0" eaLnBrk="1" latinLnBrk="0" hangingPunct="1">
         <a:lnSpc>
           <a:spcPct val="90000"/>
         </a:lnSpc>
         <a:spcBef>
-          <a:spcPts val="533"/>
+          <a:spcPts val="900"/>
         </a:spcBef>
         <a:buFont typeface="Arial" panose="020B0604020202020204" pitchFamily="34" charset="0"/>
         <a:buChar char="•"/>
-        <a:defRPr sz="1920" kern="1200">
+        <a:defRPr sz="3240" kern="1200">
           <a:solidFill>
             <a:schemeClr val="tx1"/>
           </a:solidFill>
@@ -2885,8 +2884,8 @@
       <a:defPPr>
         <a:defRPr lang="en-US"/>
       </a:defPPr>
-      <a:lvl1pPr marL="0" algn="l" defTabSz="975390" rtl="0" eaLnBrk="1" latinLnBrk="0" hangingPunct="1">
-        <a:defRPr sz="1920" kern="1200">
+      <a:lvl1pPr marL="0" algn="l" defTabSz="1645920" rtl="0" eaLnBrk="1" latinLnBrk="0" hangingPunct="1">
+        <a:defRPr sz="3240" kern="1200">
           <a:solidFill>
             <a:schemeClr val="tx1"/>
           </a:solidFill>
@@ -2895,8 +2894,8 @@
           <a:cs typeface="+mn-cs"/>
         </a:defRPr>
       </a:lvl1pPr>
-      <a:lvl2pPr marL="487695" algn="l" defTabSz="975390" rtl="0" eaLnBrk="1" latinLnBrk="0" hangingPunct="1">
-        <a:defRPr sz="1920" kern="1200">
+      <a:lvl2pPr marL="822960" algn="l" defTabSz="1645920" rtl="0" eaLnBrk="1" latinLnBrk="0" hangingPunct="1">
+        <a:defRPr sz="3240" kern="1200">
           <a:solidFill>
             <a:schemeClr val="tx1"/>
           </a:solidFill>
@@ -2905,8 +2904,8 @@
           <a:cs typeface="+mn-cs"/>
         </a:defRPr>
       </a:lvl2pPr>
-      <a:lvl3pPr marL="975390" algn="l" defTabSz="975390" rtl="0" eaLnBrk="1" latinLnBrk="0" hangingPunct="1">
-        <a:defRPr sz="1920" kern="1200">
+      <a:lvl3pPr marL="1645920" algn="l" defTabSz="1645920" rtl="0" eaLnBrk="1" latinLnBrk="0" hangingPunct="1">
+        <a:defRPr sz="3240" kern="1200">
           <a:solidFill>
             <a:schemeClr val="tx1"/>
           </a:solidFill>
@@ -2915,8 +2914,8 @@
           <a:cs typeface="+mn-cs"/>
         </a:defRPr>
       </a:lvl3pPr>
-      <a:lvl4pPr marL="1463086" algn="l" defTabSz="975390" rtl="0" eaLnBrk="1" latinLnBrk="0" hangingPunct="1">
-        <a:defRPr sz="1920" kern="1200">
+      <a:lvl4pPr marL="2468880" algn="l" defTabSz="1645920" rtl="0" eaLnBrk="1" latinLnBrk="0" hangingPunct="1">
+        <a:defRPr sz="3240" kern="1200">
           <a:solidFill>
             <a:schemeClr val="tx1"/>
           </a:solidFill>
@@ -2925,8 +2924,8 @@
           <a:cs typeface="+mn-cs"/>
         </a:defRPr>
       </a:lvl4pPr>
-      <a:lvl5pPr marL="1950781" algn="l" defTabSz="975390" rtl="0" eaLnBrk="1" latinLnBrk="0" hangingPunct="1">
-        <a:defRPr sz="1920" kern="1200">
+      <a:lvl5pPr marL="3291840" algn="l" defTabSz="1645920" rtl="0" eaLnBrk="1" latinLnBrk="0" hangingPunct="1">
+        <a:defRPr sz="3240" kern="1200">
           <a:solidFill>
             <a:schemeClr val="tx1"/>
           </a:solidFill>
@@ -2935,8 +2934,8 @@
           <a:cs typeface="+mn-cs"/>
         </a:defRPr>
       </a:lvl5pPr>
-      <a:lvl6pPr marL="2438476" algn="l" defTabSz="975390" rtl="0" eaLnBrk="1" latinLnBrk="0" hangingPunct="1">
-        <a:defRPr sz="1920" kern="1200">
+      <a:lvl6pPr marL="4114800" algn="l" defTabSz="1645920" rtl="0" eaLnBrk="1" latinLnBrk="0" hangingPunct="1">
+        <a:defRPr sz="3240" kern="1200">
           <a:solidFill>
             <a:schemeClr val="tx1"/>
           </a:solidFill>
@@ -2945,8 +2944,8 @@
           <a:cs typeface="+mn-cs"/>
         </a:defRPr>
       </a:lvl6pPr>
-      <a:lvl7pPr marL="2926171" algn="l" defTabSz="975390" rtl="0" eaLnBrk="1" latinLnBrk="0" hangingPunct="1">
-        <a:defRPr sz="1920" kern="1200">
+      <a:lvl7pPr marL="4937760" algn="l" defTabSz="1645920" rtl="0" eaLnBrk="1" latinLnBrk="0" hangingPunct="1">
+        <a:defRPr sz="3240" kern="1200">
           <a:solidFill>
             <a:schemeClr val="tx1"/>
           </a:solidFill>
@@ -2955,8 +2954,8 @@
           <a:cs typeface="+mn-cs"/>
         </a:defRPr>
       </a:lvl7pPr>
-      <a:lvl8pPr marL="3413867" algn="l" defTabSz="975390" rtl="0" eaLnBrk="1" latinLnBrk="0" hangingPunct="1">
-        <a:defRPr sz="1920" kern="1200">
+      <a:lvl8pPr marL="5760720" algn="l" defTabSz="1645920" rtl="0" eaLnBrk="1" latinLnBrk="0" hangingPunct="1">
+        <a:defRPr sz="3240" kern="1200">
           <a:solidFill>
             <a:schemeClr val="tx1"/>
           </a:solidFill>
@@ -2965,8 +2964,8 @@
           <a:cs typeface="+mn-cs"/>
         </a:defRPr>
       </a:lvl8pPr>
-      <a:lvl9pPr marL="3901562" algn="l" defTabSz="975390" rtl="0" eaLnBrk="1" latinLnBrk="0" hangingPunct="1">
-        <a:defRPr sz="1920" kern="1200">
+      <a:lvl9pPr marL="6583680" algn="l" defTabSz="1645920" rtl="0" eaLnBrk="1" latinLnBrk="0" hangingPunct="1">
+        <a:defRPr sz="3240" kern="1200">
           <a:solidFill>
             <a:schemeClr val="tx1"/>
           </a:solidFill>
@@ -3011,7 +3010,7 @@
         </p:nvGrpSpPr>
         <p:grpSpPr>
           <a:xfrm>
-            <a:off x="9469973" y="2635252"/>
+            <a:off x="9469973" y="7207252"/>
             <a:ext cx="608922" cy="2081816"/>
             <a:chOff x="8515683" y="1263650"/>
             <a:chExt cx="608922" cy="2081816"/>
@@ -3263,7 +3262,7 @@
         </p:nvSpPr>
         <p:spPr>
           <a:xfrm>
-            <a:off x="10078896" y="1546210"/>
+            <a:off x="10078897" y="6118211"/>
             <a:ext cx="2003239" cy="1200329"/>
           </a:xfrm>
           <a:prstGeom prst="rect">
@@ -3321,7 +3320,7 @@
             </p:nvSpPr>
             <p:spPr>
               <a:xfrm>
-                <a:off x="9726473" y="2943557"/>
+                <a:off x="9726474" y="7515557"/>
                 <a:ext cx="2708089" cy="1441292"/>
               </a:xfrm>
               <a:prstGeom prst="rect">
@@ -3716,7 +3715,7 @@
             </p:nvSpPr>
             <p:spPr>
               <a:xfrm>
-                <a:off x="9726473" y="2943557"/>
+                <a:off x="9726474" y="7515557"/>
                 <a:ext cx="2708089" cy="1441292"/>
               </a:xfrm>
               <a:prstGeom prst="rect">
@@ -3763,7 +3762,7 @@
         </p:nvGrpSpPr>
         <p:grpSpPr>
           <a:xfrm>
-            <a:off x="9747602" y="4581868"/>
+            <a:off x="9747603" y="9153868"/>
             <a:ext cx="2665829" cy="1815882"/>
             <a:chOff x="8651359" y="2961973"/>
             <a:chExt cx="2665829" cy="1815882"/>
@@ -3891,7 +3890,7 @@
         </p:nvGrpSpPr>
         <p:grpSpPr>
           <a:xfrm>
-            <a:off x="6226650" y="3366605"/>
+            <a:off x="6226650" y="7938605"/>
             <a:ext cx="430506" cy="584184"/>
             <a:chOff x="5272360" y="2006015"/>
             <a:chExt cx="430506" cy="573172"/>
@@ -4052,7 +4051,7 @@
         </p:nvGrpSpPr>
         <p:grpSpPr>
           <a:xfrm>
-            <a:off x="3735872" y="3366605"/>
+            <a:off x="3735872" y="7938605"/>
             <a:ext cx="428326" cy="573172"/>
             <a:chOff x="2783762" y="2006015"/>
             <a:chExt cx="428326" cy="573172"/>
@@ -4260,7 +4259,7 @@
         </p:nvSpPr>
         <p:spPr>
           <a:xfrm>
-            <a:off x="3992373" y="3792607"/>
+            <a:off x="3992374" y="8364608"/>
             <a:ext cx="2406105" cy="1200329"/>
           </a:xfrm>
           <a:prstGeom prst="rect">
@@ -4308,7 +4307,7 @@
         </p:nvGrpSpPr>
         <p:grpSpPr>
           <a:xfrm>
-            <a:off x="999268" y="3053028"/>
+            <a:off x="999269" y="7625029"/>
             <a:ext cx="2736605" cy="1200329"/>
             <a:chOff x="44977" y="3053026"/>
             <a:chExt cx="2736605" cy="1200329"/>
@@ -4449,7 +4448,7 @@
         </p:nvGrpSpPr>
         <p:grpSpPr>
           <a:xfrm>
-            <a:off x="4164198" y="1660699"/>
+            <a:off x="4164198" y="6232699"/>
             <a:ext cx="2062452" cy="1815882"/>
             <a:chOff x="3125498" y="321690"/>
             <a:chExt cx="2062452" cy="1815882"/>
@@ -4570,7 +4569,7 @@
             </p:nvSpPr>
             <p:spPr>
               <a:xfrm>
-                <a:off x="6657157" y="3111665"/>
+                <a:off x="6657158" y="7683665"/>
                 <a:ext cx="2812817" cy="1108958"/>
               </a:xfrm>
               <a:prstGeom prst="rect">
@@ -4725,7 +4724,7 @@
             </p:nvSpPr>
             <p:spPr>
               <a:xfrm>
-                <a:off x="6657157" y="3111665"/>
+                <a:off x="6657158" y="7683665"/>
                 <a:ext cx="2812817" cy="1108958"/>
               </a:xfrm>
               <a:prstGeom prst="rect">
@@ -4802,7 +4801,7 @@
         </p:nvGrpSpPr>
         <p:grpSpPr>
           <a:xfrm>
-            <a:off x="993130" y="1336516"/>
+            <a:off x="993130" y="5908516"/>
             <a:ext cx="11750300" cy="4642168"/>
             <a:chOff x="44977" y="1336516"/>
             <a:chExt cx="11750300" cy="4642168"/>
@@ -5994,8 +5993,8 @@
         </p:nvGrpSpPr>
         <p:grpSpPr>
           <a:xfrm>
-            <a:off x="999268" y="1336516"/>
-            <a:ext cx="14727709" cy="4642168"/>
+            <a:off x="999269" y="5908516"/>
+            <a:ext cx="14727709" cy="4645152"/>
             <a:chOff x="999268" y="1336516"/>
             <a:chExt cx="14727709" cy="4642168"/>
           </a:xfrm>
@@ -6443,8 +6442,8 @@
             </p:spPr>
           </p:pic>
         </p:grpSp>
-        <mc:AlternateContent xmlns:mc="http://schemas.openxmlformats.org/markup-compatibility/2006">
-          <mc:Choice xmlns:a14="http://schemas.microsoft.com/office/drawing/2010/main" Requires="a14">
+        <mc:AlternateContent xmlns:mc="http://schemas.openxmlformats.org/markup-compatibility/2006" xmlns:a14="http://schemas.microsoft.com/office/drawing/2010/main">
+          <mc:Choice Requires="a14">
             <p:sp>
               <p:nvSpPr>
                 <p:cNvPr id="26" name="TextBox 25">
@@ -6597,7 +6596,7 @@
               </p:txBody>
             </p:sp>
           </mc:Choice>
-          <mc:Fallback>
+          <mc:Fallback xmlns="">
             <p:sp>
               <p:nvSpPr>
                 <p:cNvPr id="26" name="TextBox 25">
@@ -7279,6 +7278,36 @@
 </p:sld>
 </file>
 
+<file path=ppt/slides/slide3.xml><?xml version="1.0" encoding="utf-8"?>
+<p:sld xmlns:a="http://schemas.openxmlformats.org/drawingml/2006/main" xmlns:r="http://schemas.openxmlformats.org/officeDocument/2006/relationships" xmlns:p="http://schemas.openxmlformats.org/presentationml/2006/main">
+  <p:cSld>
+    <p:spTree>
+      <p:nvGrpSpPr>
+        <p:cNvPr id="1" name=""/>
+        <p:cNvGrpSpPr/>
+        <p:nvPr/>
+      </p:nvGrpSpPr>
+      <p:grpSpPr>
+        <a:xfrm>
+          <a:off x="0" y="0"/>
+          <a:ext cx="0" cy="0"/>
+          <a:chOff x="0" y="0"/>
+          <a:chExt cx="0" cy="0"/>
+        </a:xfrm>
+      </p:grpSpPr>
+    </p:spTree>
+    <p:extLst>
+      <p:ext uri="{BB962C8B-B14F-4D97-AF65-F5344CB8AC3E}">
+        <p14:creationId xmlns:p14="http://schemas.microsoft.com/office/powerpoint/2010/main" val="2145722793"/>
+      </p:ext>
+    </p:extLst>
+  </p:cSld>
+  <p:clrMapOvr>
+    <a:masterClrMapping/>
+  </p:clrMapOvr>
+</p:sld>
+</file>
+
 <file path=ppt/theme/theme1.xml><?xml version="1.0" encoding="utf-8"?>
 <a:theme xmlns:a="http://schemas.openxmlformats.org/drawingml/2006/main" name="Office Theme">
   <a:themeElements>

</xml_diff>